<commit_message>
fixed examples/02-3-1, L2.3, L3.3
</commit_message>
<xml_diff>
--- a/Slides/Lesson 2.3 Examining More than One Value.pptx
+++ b/Slides/Lesson 2.3 Examining More than One Value.pptx
@@ -181,6 +181,10 @@
     </p:ext>
   </p:extLst>
 </p:presentation>
+</file>
+
+<file path=ppt/revisionInfo.xml><?xml version="1.0" encoding="utf-8"?>
+<p1510:revInfo xmlns:a="http://schemas.openxmlformats.org/drawingml/2006/main" xmlns:r="http://schemas.openxmlformats.org/officeDocument/2006/relationships" xmlns:p1510="http://schemas.microsoft.com/office/powerpoint/2015/10/main"/>
 </file>
 
 <file path=ppt/diagrams/colors1.xml><?xml version="1.0" encoding="utf-8"?>
@@ -4128,7 +4132,7 @@
             <a:fld id="{0FAC78B3-EDCE-4187-A1AE-28620314FA32}" type="datetimeFigureOut">
               <a:rPr lang="en-US" smtClean="0"/>
               <a:pPr/>
-              <a:t>9/17/2017</a:t>
+              <a:t>10/6/2017</a:t>
             </a:fld>
             <a:endParaRPr lang="en-US"/>
           </a:p>
@@ -4668,7 +4672,7 @@
           <a:p>
             <a:fld id="{AE36E179-9677-406E-90D9-3402BE92068A}" type="datetime1">
               <a:rPr lang="en-US" smtClean="0"/>
-              <a:t>9/17/2017</a:t>
+              <a:t>10/6/2017</a:t>
             </a:fld>
             <a:endParaRPr lang="en-US"/>
           </a:p>
@@ -4932,7 +4936,7 @@
           <a:p>
             <a:fld id="{9C106CB1-CEAE-4FA9-AC65-2E4B01C62B73}" type="datetime1">
               <a:rPr lang="en-US" smtClean="0"/>
-              <a:t>9/17/2017</a:t>
+              <a:t>10/6/2017</a:t>
             </a:fld>
             <a:endParaRPr lang="en-US"/>
           </a:p>
@@ -5112,7 +5116,7 @@
           <a:p>
             <a:fld id="{2D3DB8E0-41F1-4047-A2BB-3AF23AEFB7A8}" type="datetime1">
               <a:rPr lang="en-US" smtClean="0"/>
-              <a:t>9/17/2017</a:t>
+              <a:t>10/6/2017</a:t>
             </a:fld>
             <a:endParaRPr lang="en-US"/>
           </a:p>
@@ -5302,7 +5306,7 @@
           <a:p>
             <a:fld id="{2EDFADFF-E434-421D-BD26-7C347DAB516F}" type="datetime1">
               <a:rPr lang="en-US" smtClean="0"/>
-              <a:t>9/17/2017</a:t>
+              <a:t>10/6/2017</a:t>
             </a:fld>
             <a:endParaRPr lang="en-US"/>
           </a:p>
@@ -5565,7 +5569,7 @@
                 </a:solidFill>
               </a:rPr>
               <a:pPr/>
-              <a:t>9/17/2017</a:t>
+              <a:t>10/6/2017</a:t>
             </a:fld>
             <a:endParaRPr lang="en-US">
               <a:solidFill>
@@ -5771,7 +5775,7 @@
                 </a:solidFill>
               </a:rPr>
               <a:pPr/>
-              <a:t>9/17/2017</a:t>
+              <a:t>10/6/2017</a:t>
             </a:fld>
             <a:endParaRPr lang="en-US">
               <a:solidFill>
@@ -5976,7 +5980,7 @@
                 </a:solidFill>
               </a:rPr>
               <a:pPr/>
-              <a:t>9/17/2017</a:t>
+              <a:t>10/6/2017</a:t>
             </a:fld>
             <a:endParaRPr lang="en-US">
               <a:solidFill>
@@ -6273,7 +6277,7 @@
                 </a:solidFill>
               </a:rPr>
               <a:pPr/>
-              <a:t>9/17/2017</a:t>
+              <a:t>10/6/2017</a:t>
             </a:fld>
             <a:endParaRPr lang="en-US">
               <a:solidFill>
@@ -6481,7 +6485,7 @@
                 </a:solidFill>
               </a:rPr>
               <a:pPr/>
-              <a:t>9/17/2017</a:t>
+              <a:t>10/6/2017</a:t>
             </a:fld>
             <a:endParaRPr lang="en-US">
               <a:solidFill>
@@ -6807,7 +6811,7 @@
                 </a:solidFill>
               </a:rPr>
               <a:pPr/>
-              <a:t>9/17/2017</a:t>
+              <a:t>10/6/2017</a:t>
             </a:fld>
             <a:endParaRPr lang="en-US">
               <a:solidFill>
@@ -7124,7 +7128,7 @@
                 </a:solidFill>
               </a:rPr>
               <a:pPr/>
-              <a:t>9/17/2017</a:t>
+              <a:t>10/6/2017</a:t>
             </a:fld>
             <a:endParaRPr lang="en-US">
               <a:solidFill>
@@ -7337,7 +7341,7 @@
           <a:p>
             <a:fld id="{3B722677-7067-4D71-BF6A-8259C5E94357}" type="datetime1">
               <a:rPr lang="en-US" smtClean="0"/>
-              <a:t>9/17/2017</a:t>
+              <a:t>10/6/2017</a:t>
             </a:fld>
             <a:endParaRPr lang="en-US"/>
           </a:p>
@@ -7767,7 +7771,7 @@
                 </a:solidFill>
               </a:rPr>
               <a:pPr/>
-              <a:t>9/17/2017</a:t>
+              <a:t>10/6/2017</a:t>
             </a:fld>
             <a:endParaRPr lang="en-US">
               <a:solidFill>
@@ -7916,7 +7920,7 @@
                 </a:solidFill>
               </a:rPr>
               <a:pPr/>
-              <a:t>9/17/2017</a:t>
+              <a:t>10/6/2017</a:t>
             </a:fld>
             <a:endParaRPr lang="en-US">
               <a:solidFill>
@@ -8043,7 +8047,7 @@
                 </a:solidFill>
               </a:rPr>
               <a:pPr/>
-              <a:t>9/17/2017</a:t>
+              <a:t>10/6/2017</a:t>
             </a:fld>
             <a:endParaRPr lang="en-US">
               <a:solidFill>
@@ -8350,7 +8354,7 @@
                 </a:solidFill>
               </a:rPr>
               <a:pPr/>
-              <a:t>9/17/2017</a:t>
+              <a:t>10/6/2017</a:t>
             </a:fld>
             <a:endParaRPr lang="en-US">
               <a:solidFill>
@@ -8634,7 +8638,7 @@
                 </a:solidFill>
               </a:rPr>
               <a:pPr/>
-              <a:t>9/17/2017</a:t>
+              <a:t>10/6/2017</a:t>
             </a:fld>
             <a:endParaRPr lang="en-US">
               <a:solidFill>
@@ -8834,7 +8838,7 @@
                 </a:solidFill>
               </a:rPr>
               <a:pPr/>
-              <a:t>9/17/2017</a:t>
+              <a:t>10/6/2017</a:t>
             </a:fld>
             <a:endParaRPr lang="en-US">
               <a:solidFill>
@@ -9044,7 +9048,7 @@
                 </a:solidFill>
               </a:rPr>
               <a:pPr/>
-              <a:t>9/17/2017</a:t>
+              <a:t>10/6/2017</a:t>
             </a:fld>
             <a:endParaRPr lang="en-US">
               <a:solidFill>
@@ -9321,7 +9325,7 @@
           <a:p>
             <a:fld id="{2F1F79F5-7BEC-496A-AFC7-876E38F64D71}" type="datetime1">
               <a:rPr lang="en-US" smtClean="0"/>
-              <a:t>9/17/2017</a:t>
+              <a:t>10/6/2017</a:t>
             </a:fld>
             <a:endParaRPr lang="en-US"/>
           </a:p>
@@ -9495,7 +9499,7 @@
           <a:p>
             <a:fld id="{E22ED4DA-448D-4BB1-B935-CC112220207B}" type="datetime1">
               <a:rPr lang="en-US" smtClean="0"/>
-              <a:t>9/17/2017</a:t>
+              <a:t>10/6/2017</a:t>
             </a:fld>
             <a:endParaRPr lang="en-US"/>
           </a:p>
@@ -9668,7 +9672,7 @@
           <a:p>
             <a:fld id="{E22ED4DA-448D-4BB1-B935-CC112220207B}" type="datetime1">
               <a:rPr lang="en-US" smtClean="0"/>
-              <a:t>9/17/2017</a:t>
+              <a:t>10/6/2017</a:t>
             </a:fld>
             <a:endParaRPr lang="en-US"/>
           </a:p>
@@ -10084,7 +10088,7 @@
           <a:p>
             <a:fld id="{FF5D65A6-AB94-4435-B0B7-3743215FA46C}" type="datetime1">
               <a:rPr lang="en-US" smtClean="0"/>
-              <a:t>9/17/2017</a:t>
+              <a:t>10/6/2017</a:t>
             </a:fld>
             <a:endParaRPr lang="en-US"/>
           </a:p>
@@ -10260,7 +10264,7 @@
           <a:p>
             <a:fld id="{FF5D65A6-AB94-4435-B0B7-3743215FA46C}" type="datetime1">
               <a:rPr lang="en-US" smtClean="0"/>
-              <a:t>9/17/2017</a:t>
+              <a:t>10/6/2017</a:t>
             </a:fld>
             <a:endParaRPr lang="en-US"/>
           </a:p>
@@ -10554,7 +10558,7 @@
           <a:p>
             <a:fld id="{7C193DC4-6EF0-48C9-B29C-616106A645E1}" type="datetime1">
               <a:rPr lang="en-US" smtClean="0"/>
-              <a:t>9/17/2017</a:t>
+              <a:t>10/6/2017</a:t>
             </a:fld>
             <a:endParaRPr lang="en-US"/>
           </a:p>
@@ -10839,7 +10843,7 @@
           <a:p>
             <a:fld id="{5D1846AD-9252-4647-9435-4C2AC365653A}" type="datetime1">
               <a:rPr lang="en-US" smtClean="0"/>
-              <a:t>9/17/2017</a:t>
+              <a:t>10/6/2017</a:t>
             </a:fld>
             <a:endParaRPr lang="en-US"/>
           </a:p>
@@ -11258,7 +11262,7 @@
           <a:p>
             <a:fld id="{CE56DC10-3561-4063-A6AF-C1CC7A41040A}" type="datetime1">
               <a:rPr lang="en-US" smtClean="0"/>
-              <a:t>9/17/2017</a:t>
+              <a:t>10/6/2017</a:t>
             </a:fld>
             <a:endParaRPr lang="en-US"/>
           </a:p>
@@ -11375,7 +11379,7 @@
           <a:p>
             <a:fld id="{2F7B77F5-1464-4F6B-92A8-64FC8A508293}" type="datetime1">
               <a:rPr lang="en-US" smtClean="0"/>
-              <a:t>9/17/2017</a:t>
+              <a:t>10/6/2017</a:t>
             </a:fld>
             <a:endParaRPr lang="en-US"/>
           </a:p>
@@ -11470,7 +11474,7 @@
           <a:p>
             <a:fld id="{0A05703A-7669-4FEA-9056-25299B4D29D4}" type="datetime1">
               <a:rPr lang="en-US" smtClean="0"/>
-              <a:t>9/17/2017</a:t>
+              <a:t>10/6/2017</a:t>
             </a:fld>
             <a:endParaRPr lang="en-US"/>
           </a:p>
@@ -11745,7 +11749,7 @@
           <a:p>
             <a:fld id="{6E5077B5-BB57-49DB-88CA-226A139E5C01}" type="datetime1">
               <a:rPr lang="en-US" smtClean="0"/>
-              <a:t>9/17/2017</a:t>
+              <a:t>10/6/2017</a:t>
             </a:fld>
             <a:endParaRPr lang="en-US"/>
           </a:p>
@@ -11997,7 +12001,7 @@
           <a:p>
             <a:fld id="{C48D9447-CBD6-49A1-89FD-8512A8CF8999}" type="datetime1">
               <a:rPr lang="en-US" smtClean="0"/>
-              <a:t>9/17/2017</a:t>
+              <a:t>10/6/2017</a:t>
             </a:fld>
             <a:endParaRPr lang="en-US"/>
           </a:p>
@@ -12165,7 +12169,7 @@
           <a:p>
             <a:fld id="{A3639A2A-823D-48B7-9ACE-7FAF42870BA9}" type="datetime1">
               <a:rPr lang="en-US" smtClean="0"/>
-              <a:t>9/17/2017</a:t>
+              <a:t>10/6/2017</a:t>
             </a:fld>
             <a:endParaRPr lang="en-US"/>
           </a:p>
@@ -12418,7 +12422,7 @@
           <a:p>
             <a:fld id="{0C6FD516-C588-49F9-8A09-31EF43101ACE}" type="datetime1">
               <a:rPr lang="en-US" smtClean="0"/>
-              <a:t>9/17/2017</a:t>
+              <a:t>10/6/2017</a:t>
             </a:fld>
             <a:endParaRPr lang="en-US"/>
           </a:p>
@@ -12600,7 +12604,7 @@
           <a:p>
             <a:fld id="{ED1B6996-82E9-463C-972C-7B56056E426C}" type="datetime1">
               <a:rPr lang="en-US" smtClean="0"/>
-              <a:t>9/17/2017</a:t>
+              <a:t>10/6/2017</a:t>
             </a:fld>
             <a:endParaRPr lang="en-US"/>
           </a:p>
@@ -12840,7 +12844,7 @@
           <a:p>
             <a:fld id="{CA8B1E08-976E-451D-97C5-3D69BA983FFE}" type="datetime1">
               <a:rPr lang="en-US" smtClean="0"/>
-              <a:t>9/17/2017</a:t>
+              <a:t>10/6/2017</a:t>
             </a:fld>
             <a:endParaRPr lang="en-US" dirty="0"/>
           </a:p>
@@ -13021,7 +13025,7 @@
           <a:p>
             <a:fld id="{DC7A6930-E356-4864-92C1-40AC7A5201AA}" type="datetime1">
               <a:rPr lang="en-US" smtClean="0"/>
-              <a:t>9/17/2017</a:t>
+              <a:t>10/6/2017</a:t>
             </a:fld>
             <a:endParaRPr lang="en-US" dirty="0"/>
           </a:p>
@@ -13201,7 +13205,7 @@
           <a:p>
             <a:fld id="{45C1EE53-8F27-4821-8161-190499C0D007}" type="datetime1">
               <a:rPr lang="en-US" smtClean="0"/>
-              <a:t>9/17/2017</a:t>
+              <a:t>10/6/2017</a:t>
             </a:fld>
             <a:endParaRPr lang="en-US" dirty="0"/>
           </a:p>
@@ -13446,7 +13450,7 @@
           <a:p>
             <a:fld id="{0D423975-99FA-4807-B1B4-A59DEFED898A}" type="datetime1">
               <a:rPr lang="en-US" smtClean="0"/>
-              <a:t>9/17/2017</a:t>
+              <a:t>10/6/2017</a:t>
             </a:fld>
             <a:endParaRPr lang="en-US" dirty="0"/>
           </a:p>
@@ -13732,7 +13736,7 @@
           <a:p>
             <a:fld id="{90F7752F-4922-4BAA-9C20-D4DAF4ED08B5}" type="datetime1">
               <a:rPr lang="en-US" smtClean="0"/>
-              <a:t>9/17/2017</a:t>
+              <a:t>10/6/2017</a:t>
             </a:fld>
             <a:endParaRPr lang="en-US" dirty="0"/>
           </a:p>
@@ -14152,7 +14156,7 @@
           <a:p>
             <a:fld id="{3536A633-E76F-4E07-A3AE-A7A784889AE2}" type="datetime1">
               <a:rPr lang="en-US" smtClean="0"/>
-              <a:t>9/17/2017</a:t>
+              <a:t>10/6/2017</a:t>
             </a:fld>
             <a:endParaRPr lang="en-US" dirty="0"/>
           </a:p>
@@ -14270,7 +14274,7 @@
           <a:p>
             <a:fld id="{61CB5BDE-D72B-4A3A-925B-2A5C22F639AF}" type="datetime1">
               <a:rPr lang="en-US" smtClean="0"/>
-              <a:t>9/17/2017</a:t>
+              <a:t>10/6/2017</a:t>
             </a:fld>
             <a:endParaRPr lang="en-US" dirty="0"/>
           </a:p>
@@ -14366,7 +14370,7 @@
           <a:p>
             <a:fld id="{A24C7B69-131B-4374-A9CC-0845A85B9B89}" type="datetime1">
               <a:rPr lang="en-US" smtClean="0"/>
-              <a:t>9/17/2017</a:t>
+              <a:t>10/6/2017</a:t>
             </a:fld>
             <a:endParaRPr lang="en-US" dirty="0"/>
           </a:p>
@@ -14642,7 +14646,7 @@
           <a:p>
             <a:fld id="{2F57E60E-10B6-4F85-8F8E-D3A8141030E0}" type="datetime1">
               <a:rPr lang="en-US" smtClean="0"/>
-              <a:t>9/17/2017</a:t>
+              <a:t>10/6/2017</a:t>
             </a:fld>
             <a:endParaRPr lang="en-US" dirty="0"/>
           </a:p>
@@ -14936,7 +14940,7 @@
           <a:p>
             <a:fld id="{62847054-0C3A-4855-B827-AB022CCDB352}" type="datetime1">
               <a:rPr lang="en-US" smtClean="0"/>
-              <a:t>9/17/2017</a:t>
+              <a:t>10/6/2017</a:t>
             </a:fld>
             <a:endParaRPr lang="en-US"/>
           </a:p>
@@ -15192,7 +15196,7 @@
           <a:p>
             <a:fld id="{F33D5BC8-75F3-411B-AA7E-18F2517CF048}" type="datetime1">
               <a:rPr lang="en-US" smtClean="0"/>
-              <a:t>9/17/2017</a:t>
+              <a:t>10/6/2017</a:t>
             </a:fld>
             <a:endParaRPr lang="en-US" dirty="0"/>
           </a:p>
@@ -15361,7 +15365,7 @@
           <a:p>
             <a:fld id="{394448D4-AED6-43DB-A0F8-CD4938D2549C}" type="datetime1">
               <a:rPr lang="en-US" smtClean="0"/>
-              <a:t>9/17/2017</a:t>
+              <a:t>10/6/2017</a:t>
             </a:fld>
             <a:endParaRPr lang="en-US" dirty="0"/>
           </a:p>
@@ -15661,7 +15665,7 @@
           <a:p>
             <a:fld id="{5D1846AD-9252-4647-9435-4C2AC365653A}" type="datetime1">
               <a:rPr lang="en-US" smtClean="0"/>
-              <a:t>9/17/2017</a:t>
+              <a:t>10/6/2017</a:t>
             </a:fld>
             <a:endParaRPr lang="en-US"/>
           </a:p>
@@ -15839,7 +15843,7 @@
           <a:p>
             <a:fld id="{160CE893-3A38-428F-89AB-E97AD9CAA95E}" type="datetime1">
               <a:rPr lang="en-US" smtClean="0"/>
-              <a:t>9/17/2017</a:t>
+              <a:t>10/6/2017</a:t>
             </a:fld>
             <a:endParaRPr lang="en-US" dirty="0"/>
           </a:p>
@@ -16267,7 +16271,7 @@
           <a:p>
             <a:fld id="{787C7470-D2BA-4210-A881-18C149229110}" type="datetime1">
               <a:rPr lang="en-US" smtClean="0"/>
-              <a:t>9/17/2017</a:t>
+              <a:t>10/6/2017</a:t>
             </a:fld>
             <a:endParaRPr lang="en-US"/>
           </a:p>
@@ -16396,7 +16400,7 @@
           <a:p>
             <a:fld id="{8DEC73FD-A5ED-479F-9068-BAD5EB3F7E69}" type="datetime1">
               <a:rPr lang="en-US" smtClean="0"/>
-              <a:t>9/17/2017</a:t>
+              <a:t>10/6/2017</a:t>
             </a:fld>
             <a:endParaRPr lang="en-US"/>
           </a:p>
@@ -16503,7 +16507,7 @@
           <a:p>
             <a:fld id="{EA1BC252-941B-4451-B02D-F879104EB58F}" type="datetime1">
               <a:rPr lang="en-US" smtClean="0"/>
-              <a:t>9/17/2017</a:t>
+              <a:t>10/6/2017</a:t>
             </a:fld>
             <a:endParaRPr lang="en-US"/>
           </a:p>
@@ -16790,7 +16794,7 @@
           <a:p>
             <a:fld id="{43A8641F-9EDF-4983-849A-96C94386CBBC}" type="datetime1">
               <a:rPr lang="en-US" smtClean="0"/>
-              <a:t>9/17/2017</a:t>
+              <a:t>10/6/2017</a:t>
             </a:fld>
             <a:endParaRPr lang="en-US"/>
           </a:p>
@@ -17440,7 +17444,7 @@
                 </a:solidFill>
               </a:rPr>
               <a:pPr/>
-              <a:t>9/17/2017</a:t>
+              <a:t>10/6/2017</a:t>
             </a:fld>
             <a:endParaRPr lang="en-US">
               <a:solidFill>
@@ -17977,7 +17981,7 @@
           <a:p>
             <a:fld id="{02B3F677-983B-48DB-ADFD-63FE6CBC7FB2}" type="datetime1">
               <a:rPr lang="en-US" smtClean="0"/>
-              <a:t>9/17/2017</a:t>
+              <a:t>10/6/2017</a:t>
             </a:fld>
             <a:endParaRPr lang="en-US"/>
           </a:p>
@@ -18501,7 +18505,7 @@
           <a:p>
             <a:fld id="{8684A8BA-DEEC-47D2-87F9-8204232D7DB8}" type="datetime1">
               <a:rPr lang="en-US" smtClean="0"/>
-              <a:t>9/17/2017</a:t>
+              <a:t>10/6/2017</a:t>
             </a:fld>
             <a:endParaRPr lang="en-US" dirty="0"/>
           </a:p>
@@ -19185,7 +19189,15 @@
           <a:p>
             <a:r>
               <a:rPr lang="en-US" sz="1400" dirty="0"/>
-              <a:t>;;   (ball x y radius selected?)</a:t>
+              <a:t>;;   </a:t>
+            </a:r>
+            <a:r>
+              <a:rPr lang="en-US" sz="1400"/>
+              <a:t>(make-ball </a:t>
+            </a:r>
+            <a:r>
+              <a:rPr lang="en-US" sz="1400" dirty="0"/>
+              <a:t>x y radius selected?)</a:t>
             </a:r>
           </a:p>
           <a:p>

</xml_diff>